<commit_message>
Added UI slides and notes
</commit_message>
<xml_diff>
--- a/MediClip Presentation.pptx
+++ b/MediClip Presentation.pptx
@@ -4,11 +4,17 @@
   <p:sldMasterIdLst>
     <p:sldMasterId id="2147483648" r:id="rId1"/>
   </p:sldMasterIdLst>
+  <p:notesMasterIdLst>
+    <p:notesMasterId r:id="rId9"/>
+  </p:notesMasterIdLst>
   <p:sldIdLst>
     <p:sldId id="256" r:id="rId2"/>
     <p:sldId id="257" r:id="rId3"/>
     <p:sldId id="258" r:id="rId4"/>
     <p:sldId id="259" r:id="rId5"/>
+    <p:sldId id="260" r:id="rId6"/>
+    <p:sldId id="261" r:id="rId7"/>
+    <p:sldId id="262" r:id="rId8"/>
   </p:sldIdLst>
   <p:sldSz cx="12192000" cy="6858000"/>
   <p:notesSz cx="6858000" cy="9144000"/>
@@ -113,6 +119,666 @@
     </p:ext>
   </p:extLst>
 </p:presentation>
+</file>
+
+<file path=ppt/notesMasters/notesMaster1.xml><?xml version="1.0" encoding="utf-8"?>
+<p:notesMaster xmlns:a="http://schemas.openxmlformats.org/drawingml/2006/main" xmlns:r="http://schemas.openxmlformats.org/officeDocument/2006/relationships" xmlns:p="http://schemas.openxmlformats.org/presentationml/2006/main">
+  <p:cSld>
+    <p:bg>
+      <p:bgRef idx="1001">
+        <a:schemeClr val="bg1"/>
+      </p:bgRef>
+    </p:bg>
+    <p:spTree>
+      <p:nvGrpSpPr>
+        <p:cNvPr id="1" name=""/>
+        <p:cNvGrpSpPr/>
+        <p:nvPr/>
+      </p:nvGrpSpPr>
+      <p:grpSpPr>
+        <a:xfrm>
+          <a:off x="0" y="0"/>
+          <a:ext cx="0" cy="0"/>
+          <a:chOff x="0" y="0"/>
+          <a:chExt cx="0" cy="0"/>
+        </a:xfrm>
+      </p:grpSpPr>
+      <p:sp>
+        <p:nvSpPr>
+          <p:cNvPr id="2" name="Header Placeholder 1"/>
+          <p:cNvSpPr>
+            <a:spLocks noGrp="1"/>
+          </p:cNvSpPr>
+          <p:nvPr>
+            <p:ph type="hdr" sz="quarter"/>
+          </p:nvPr>
+        </p:nvSpPr>
+        <p:spPr>
+          <a:xfrm>
+            <a:off x="0" y="0"/>
+            <a:ext cx="2971800" cy="458788"/>
+          </a:xfrm>
+          <a:prstGeom prst="rect">
+            <a:avLst/>
+          </a:prstGeom>
+        </p:spPr>
+        <p:txBody>
+          <a:bodyPr vert="horz" lIns="91440" tIns="45720" rIns="91440" bIns="45720" rtlCol="0"/>
+          <a:lstStyle>
+            <a:lvl1pPr algn="l">
+              <a:defRPr sz="1200"/>
+            </a:lvl1pPr>
+          </a:lstStyle>
+          <a:p>
+            <a:endParaRPr lang="en-AU"/>
+          </a:p>
+        </p:txBody>
+      </p:sp>
+      <p:sp>
+        <p:nvSpPr>
+          <p:cNvPr id="3" name="Date Placeholder 2"/>
+          <p:cNvSpPr>
+            <a:spLocks noGrp="1"/>
+          </p:cNvSpPr>
+          <p:nvPr>
+            <p:ph type="dt" idx="1"/>
+          </p:nvPr>
+        </p:nvSpPr>
+        <p:spPr>
+          <a:xfrm>
+            <a:off x="3884613" y="0"/>
+            <a:ext cx="2971800" cy="458788"/>
+          </a:xfrm>
+          <a:prstGeom prst="rect">
+            <a:avLst/>
+          </a:prstGeom>
+        </p:spPr>
+        <p:txBody>
+          <a:bodyPr vert="horz" lIns="91440" tIns="45720" rIns="91440" bIns="45720" rtlCol="0"/>
+          <a:lstStyle>
+            <a:lvl1pPr algn="r">
+              <a:defRPr sz="1200"/>
+            </a:lvl1pPr>
+          </a:lstStyle>
+          <a:p>
+            <a:fld id="{EF276E67-CA31-409F-9CB9-A8BEB2F0752C}" type="datetimeFigureOut">
+              <a:rPr lang="en-AU" smtClean="0"/>
+              <a:t>1/09/2018</a:t>
+            </a:fld>
+            <a:endParaRPr lang="en-AU"/>
+          </a:p>
+        </p:txBody>
+      </p:sp>
+      <p:sp>
+        <p:nvSpPr>
+          <p:cNvPr id="4" name="Slide Image Placeholder 3"/>
+          <p:cNvSpPr>
+            <a:spLocks noGrp="1" noRot="1" noChangeAspect="1"/>
+          </p:cNvSpPr>
+          <p:nvPr>
+            <p:ph type="sldImg" idx="2"/>
+          </p:nvPr>
+        </p:nvSpPr>
+        <p:spPr>
+          <a:xfrm>
+            <a:off x="685800" y="1143000"/>
+            <a:ext cx="5486400" cy="3086100"/>
+          </a:xfrm>
+          <a:prstGeom prst="rect">
+            <a:avLst/>
+          </a:prstGeom>
+          <a:noFill/>
+          <a:ln w="12700">
+            <a:solidFill>
+              <a:prstClr val="black"/>
+            </a:solidFill>
+          </a:ln>
+        </p:spPr>
+        <p:txBody>
+          <a:bodyPr vert="horz" lIns="91440" tIns="45720" rIns="91440" bIns="45720" rtlCol="0" anchor="ctr"/>
+          <a:lstStyle/>
+          <a:p>
+            <a:endParaRPr lang="en-AU"/>
+          </a:p>
+        </p:txBody>
+      </p:sp>
+      <p:sp>
+        <p:nvSpPr>
+          <p:cNvPr id="5" name="Notes Placeholder 4"/>
+          <p:cNvSpPr>
+            <a:spLocks noGrp="1"/>
+          </p:cNvSpPr>
+          <p:nvPr>
+            <p:ph type="body" sz="quarter" idx="3"/>
+          </p:nvPr>
+        </p:nvSpPr>
+        <p:spPr>
+          <a:xfrm>
+            <a:off x="685800" y="4400550"/>
+            <a:ext cx="5486400" cy="3600450"/>
+          </a:xfrm>
+          <a:prstGeom prst="rect">
+            <a:avLst/>
+          </a:prstGeom>
+        </p:spPr>
+        <p:txBody>
+          <a:bodyPr vert="horz" lIns="91440" tIns="45720" rIns="91440" bIns="45720" rtlCol="0"/>
+          <a:lstStyle/>
+          <a:p>
+            <a:pPr lvl="0"/>
+            <a:r>
+              <a:rPr lang="en-US"/>
+              <a:t>Edit Master text styles</a:t>
+            </a:r>
+          </a:p>
+          <a:p>
+            <a:pPr lvl="1"/>
+            <a:r>
+              <a:rPr lang="en-US"/>
+              <a:t>Second level</a:t>
+            </a:r>
+          </a:p>
+          <a:p>
+            <a:pPr lvl="2"/>
+            <a:r>
+              <a:rPr lang="en-US"/>
+              <a:t>Third level</a:t>
+            </a:r>
+          </a:p>
+          <a:p>
+            <a:pPr lvl="3"/>
+            <a:r>
+              <a:rPr lang="en-US"/>
+              <a:t>Fourth level</a:t>
+            </a:r>
+          </a:p>
+          <a:p>
+            <a:pPr lvl="4"/>
+            <a:r>
+              <a:rPr lang="en-US"/>
+              <a:t>Fifth level</a:t>
+            </a:r>
+            <a:endParaRPr lang="en-AU"/>
+          </a:p>
+        </p:txBody>
+      </p:sp>
+      <p:sp>
+        <p:nvSpPr>
+          <p:cNvPr id="6" name="Footer Placeholder 5"/>
+          <p:cNvSpPr>
+            <a:spLocks noGrp="1"/>
+          </p:cNvSpPr>
+          <p:nvPr>
+            <p:ph type="ftr" sz="quarter" idx="4"/>
+          </p:nvPr>
+        </p:nvSpPr>
+        <p:spPr>
+          <a:xfrm>
+            <a:off x="0" y="8685213"/>
+            <a:ext cx="2971800" cy="458787"/>
+          </a:xfrm>
+          <a:prstGeom prst="rect">
+            <a:avLst/>
+          </a:prstGeom>
+        </p:spPr>
+        <p:txBody>
+          <a:bodyPr vert="horz" lIns="91440" tIns="45720" rIns="91440" bIns="45720" rtlCol="0" anchor="b"/>
+          <a:lstStyle>
+            <a:lvl1pPr algn="l">
+              <a:defRPr sz="1200"/>
+            </a:lvl1pPr>
+          </a:lstStyle>
+          <a:p>
+            <a:endParaRPr lang="en-AU"/>
+          </a:p>
+        </p:txBody>
+      </p:sp>
+      <p:sp>
+        <p:nvSpPr>
+          <p:cNvPr id="7" name="Slide Number Placeholder 6"/>
+          <p:cNvSpPr>
+            <a:spLocks noGrp="1"/>
+          </p:cNvSpPr>
+          <p:nvPr>
+            <p:ph type="sldNum" sz="quarter" idx="5"/>
+          </p:nvPr>
+        </p:nvSpPr>
+        <p:spPr>
+          <a:xfrm>
+            <a:off x="3884613" y="8685213"/>
+            <a:ext cx="2971800" cy="458787"/>
+          </a:xfrm>
+          <a:prstGeom prst="rect">
+            <a:avLst/>
+          </a:prstGeom>
+        </p:spPr>
+        <p:txBody>
+          <a:bodyPr vert="horz" lIns="91440" tIns="45720" rIns="91440" bIns="45720" rtlCol="0" anchor="b"/>
+          <a:lstStyle>
+            <a:lvl1pPr algn="r">
+              <a:defRPr sz="1200"/>
+            </a:lvl1pPr>
+          </a:lstStyle>
+          <a:p>
+            <a:fld id="{5DBDFD66-C54F-4B15-9351-98B5EC069B7B}" type="slidenum">
+              <a:rPr lang="en-AU" smtClean="0"/>
+              <a:t>‹#›</a:t>
+            </a:fld>
+            <a:endParaRPr lang="en-AU"/>
+          </a:p>
+        </p:txBody>
+      </p:sp>
+    </p:spTree>
+    <p:extLst>
+      <p:ext uri="{BB962C8B-B14F-4D97-AF65-F5344CB8AC3E}">
+        <p14:creationId xmlns:p14="http://schemas.microsoft.com/office/powerpoint/2010/main" val="3241020005"/>
+      </p:ext>
+    </p:extLst>
+  </p:cSld>
+  <p:clrMap bg1="lt1" tx1="dk1" bg2="lt2" tx2="dk2" accent1="accent1" accent2="accent2" accent3="accent3" accent4="accent4" accent5="accent5" accent6="accent6" hlink="hlink" folHlink="folHlink"/>
+  <p:notesStyle>
+    <a:lvl1pPr marL="0" algn="l" defTabSz="914400" rtl="0" eaLnBrk="1" latinLnBrk="0" hangingPunct="1">
+      <a:defRPr sz="1200" kern="1200">
+        <a:solidFill>
+          <a:schemeClr val="tx1"/>
+        </a:solidFill>
+        <a:latin typeface="+mn-lt"/>
+        <a:ea typeface="+mn-ea"/>
+        <a:cs typeface="+mn-cs"/>
+      </a:defRPr>
+    </a:lvl1pPr>
+    <a:lvl2pPr marL="457200" algn="l" defTabSz="914400" rtl="0" eaLnBrk="1" latinLnBrk="0" hangingPunct="1">
+      <a:defRPr sz="1200" kern="1200">
+        <a:solidFill>
+          <a:schemeClr val="tx1"/>
+        </a:solidFill>
+        <a:latin typeface="+mn-lt"/>
+        <a:ea typeface="+mn-ea"/>
+        <a:cs typeface="+mn-cs"/>
+      </a:defRPr>
+    </a:lvl2pPr>
+    <a:lvl3pPr marL="914400" algn="l" defTabSz="914400" rtl="0" eaLnBrk="1" latinLnBrk="0" hangingPunct="1">
+      <a:defRPr sz="1200" kern="1200">
+        <a:solidFill>
+          <a:schemeClr val="tx1"/>
+        </a:solidFill>
+        <a:latin typeface="+mn-lt"/>
+        <a:ea typeface="+mn-ea"/>
+        <a:cs typeface="+mn-cs"/>
+      </a:defRPr>
+    </a:lvl3pPr>
+    <a:lvl4pPr marL="1371600" algn="l" defTabSz="914400" rtl="0" eaLnBrk="1" latinLnBrk="0" hangingPunct="1">
+      <a:defRPr sz="1200" kern="1200">
+        <a:solidFill>
+          <a:schemeClr val="tx1"/>
+        </a:solidFill>
+        <a:latin typeface="+mn-lt"/>
+        <a:ea typeface="+mn-ea"/>
+        <a:cs typeface="+mn-cs"/>
+      </a:defRPr>
+    </a:lvl4pPr>
+    <a:lvl5pPr marL="1828800" algn="l" defTabSz="914400" rtl="0" eaLnBrk="1" latinLnBrk="0" hangingPunct="1">
+      <a:defRPr sz="1200" kern="1200">
+        <a:solidFill>
+          <a:schemeClr val="tx1"/>
+        </a:solidFill>
+        <a:latin typeface="+mn-lt"/>
+        <a:ea typeface="+mn-ea"/>
+        <a:cs typeface="+mn-cs"/>
+      </a:defRPr>
+    </a:lvl5pPr>
+    <a:lvl6pPr marL="2286000" algn="l" defTabSz="914400" rtl="0" eaLnBrk="1" latinLnBrk="0" hangingPunct="1">
+      <a:defRPr sz="1200" kern="1200">
+        <a:solidFill>
+          <a:schemeClr val="tx1"/>
+        </a:solidFill>
+        <a:latin typeface="+mn-lt"/>
+        <a:ea typeface="+mn-ea"/>
+        <a:cs typeface="+mn-cs"/>
+      </a:defRPr>
+    </a:lvl6pPr>
+    <a:lvl7pPr marL="2743200" algn="l" defTabSz="914400" rtl="0" eaLnBrk="1" latinLnBrk="0" hangingPunct="1">
+      <a:defRPr sz="1200" kern="1200">
+        <a:solidFill>
+          <a:schemeClr val="tx1"/>
+        </a:solidFill>
+        <a:latin typeface="+mn-lt"/>
+        <a:ea typeface="+mn-ea"/>
+        <a:cs typeface="+mn-cs"/>
+      </a:defRPr>
+    </a:lvl7pPr>
+    <a:lvl8pPr marL="3200400" algn="l" defTabSz="914400" rtl="0" eaLnBrk="1" latinLnBrk="0" hangingPunct="1">
+      <a:defRPr sz="1200" kern="1200">
+        <a:solidFill>
+          <a:schemeClr val="tx1"/>
+        </a:solidFill>
+        <a:latin typeface="+mn-lt"/>
+        <a:ea typeface="+mn-ea"/>
+        <a:cs typeface="+mn-cs"/>
+      </a:defRPr>
+    </a:lvl8pPr>
+    <a:lvl9pPr marL="3657600" algn="l" defTabSz="914400" rtl="0" eaLnBrk="1" latinLnBrk="0" hangingPunct="1">
+      <a:defRPr sz="1200" kern="1200">
+        <a:solidFill>
+          <a:schemeClr val="tx1"/>
+        </a:solidFill>
+        <a:latin typeface="+mn-lt"/>
+        <a:ea typeface="+mn-ea"/>
+        <a:cs typeface="+mn-cs"/>
+      </a:defRPr>
+    </a:lvl9pPr>
+  </p:notesStyle>
+</p:notesMaster>
+</file>
+
+<file path=ppt/notesSlides/notesSlide1.xml><?xml version="1.0" encoding="utf-8"?>
+<p:notes xmlns:a="http://schemas.openxmlformats.org/drawingml/2006/main" xmlns:r="http://schemas.openxmlformats.org/officeDocument/2006/relationships" xmlns:p="http://schemas.openxmlformats.org/presentationml/2006/main">
+  <p:cSld>
+    <p:spTree>
+      <p:nvGrpSpPr>
+        <p:cNvPr id="1" name=""/>
+        <p:cNvGrpSpPr/>
+        <p:nvPr/>
+      </p:nvGrpSpPr>
+      <p:grpSpPr>
+        <a:xfrm>
+          <a:off x="0" y="0"/>
+          <a:ext cx="0" cy="0"/>
+          <a:chOff x="0" y="0"/>
+          <a:chExt cx="0" cy="0"/>
+        </a:xfrm>
+      </p:grpSpPr>
+      <p:sp>
+        <p:nvSpPr>
+          <p:cNvPr id="2" name="Slide Image Placeholder 1"/>
+          <p:cNvSpPr>
+            <a:spLocks noGrp="1" noRot="1" noChangeAspect="1"/>
+          </p:cNvSpPr>
+          <p:nvPr>
+            <p:ph type="sldImg"/>
+          </p:nvPr>
+        </p:nvSpPr>
+        <p:spPr/>
+      </p:sp>
+      <p:sp>
+        <p:nvSpPr>
+          <p:cNvPr id="3" name="Notes Placeholder 2"/>
+          <p:cNvSpPr>
+            <a:spLocks noGrp="1"/>
+          </p:cNvSpPr>
+          <p:nvPr>
+            <p:ph type="body" idx="1"/>
+          </p:nvPr>
+        </p:nvSpPr>
+        <p:spPr/>
+        <p:txBody>
+          <a:bodyPr/>
+          <a:lstStyle/>
+          <a:p>
+            <a:r>
+              <a:rPr lang="en-US" dirty="0"/>
+              <a:t>* General Navigation</a:t>
+            </a:r>
+          </a:p>
+          <a:p>
+            <a:r>
+              <a:rPr lang="en-US" dirty="0"/>
+              <a:t>For general navigation the application will have a persistent toolbar. This toolbar will contain a page title and a hamburger menu. This menu provides shortcuts for easy navigation to the home page, view assigned patients and also an option to sign out of the app. The Android OS also provides a back button. We will also add a back button to the iOS versions toolbar since one is not provided natively.</a:t>
+            </a:r>
+          </a:p>
+          <a:p>
+            <a:r>
+              <a:rPr lang="en-US" dirty="0"/>
+              <a:t>* Sign in</a:t>
+            </a:r>
+          </a:p>
+          <a:p>
+            <a:r>
+              <a:rPr lang="en-US" dirty="0"/>
+              <a:t>The first thing the user is presented with is a sign in page. Once the user signs in the home page is displayed.</a:t>
+            </a:r>
+          </a:p>
+          <a:p>
+            <a:r>
+              <a:rPr lang="en-US" dirty="0"/>
+              <a:t>* Home Page</a:t>
+            </a:r>
+          </a:p>
+          <a:p>
+            <a:r>
+              <a:rPr lang="en-US" dirty="0"/>
+              <a:t>From the home page the user will see all their assigned wards. The total amount of patients in the ward is also displayed. From here the user can tap on one of the wards to view the patients assigned to that specific ward.</a:t>
+            </a:r>
+          </a:p>
+          <a:p>
+            <a:endParaRPr lang="en-AU" dirty="0"/>
+          </a:p>
+          <a:p>
+            <a:endParaRPr lang="en-AU" dirty="0"/>
+          </a:p>
+        </p:txBody>
+      </p:sp>
+      <p:sp>
+        <p:nvSpPr>
+          <p:cNvPr id="4" name="Slide Number Placeholder 3"/>
+          <p:cNvSpPr>
+            <a:spLocks noGrp="1"/>
+          </p:cNvSpPr>
+          <p:nvPr>
+            <p:ph type="sldNum" sz="quarter" idx="10"/>
+          </p:nvPr>
+        </p:nvSpPr>
+        <p:spPr/>
+        <p:txBody>
+          <a:bodyPr/>
+          <a:lstStyle/>
+          <a:p>
+            <a:fld id="{5DBDFD66-C54F-4B15-9351-98B5EC069B7B}" type="slidenum">
+              <a:rPr lang="en-AU" smtClean="0"/>
+              <a:t>5</a:t>
+            </a:fld>
+            <a:endParaRPr lang="en-AU"/>
+          </a:p>
+        </p:txBody>
+      </p:sp>
+    </p:spTree>
+    <p:extLst>
+      <p:ext uri="{BB962C8B-B14F-4D97-AF65-F5344CB8AC3E}">
+        <p14:creationId xmlns:p14="http://schemas.microsoft.com/office/powerpoint/2010/main" val="3956962256"/>
+      </p:ext>
+    </p:extLst>
+  </p:cSld>
+  <p:clrMapOvr>
+    <a:masterClrMapping/>
+  </p:clrMapOvr>
+</p:notes>
+</file>
+
+<file path=ppt/notesSlides/notesSlide2.xml><?xml version="1.0" encoding="utf-8"?>
+<p:notes xmlns:a="http://schemas.openxmlformats.org/drawingml/2006/main" xmlns:r="http://schemas.openxmlformats.org/officeDocument/2006/relationships" xmlns:p="http://schemas.openxmlformats.org/presentationml/2006/main">
+  <p:cSld>
+    <p:spTree>
+      <p:nvGrpSpPr>
+        <p:cNvPr id="1" name=""/>
+        <p:cNvGrpSpPr/>
+        <p:nvPr/>
+      </p:nvGrpSpPr>
+      <p:grpSpPr>
+        <a:xfrm>
+          <a:off x="0" y="0"/>
+          <a:ext cx="0" cy="0"/>
+          <a:chOff x="0" y="0"/>
+          <a:chExt cx="0" cy="0"/>
+        </a:xfrm>
+      </p:grpSpPr>
+      <p:sp>
+        <p:nvSpPr>
+          <p:cNvPr id="2" name="Slide Image Placeholder 1"/>
+          <p:cNvSpPr>
+            <a:spLocks noGrp="1" noRot="1" noChangeAspect="1"/>
+          </p:cNvSpPr>
+          <p:nvPr>
+            <p:ph type="sldImg"/>
+          </p:nvPr>
+        </p:nvSpPr>
+        <p:spPr/>
+      </p:sp>
+      <p:sp>
+        <p:nvSpPr>
+          <p:cNvPr id="3" name="Notes Placeholder 2"/>
+          <p:cNvSpPr>
+            <a:spLocks noGrp="1"/>
+          </p:cNvSpPr>
+          <p:nvPr>
+            <p:ph type="body" idx="1"/>
+          </p:nvPr>
+        </p:nvSpPr>
+        <p:spPr/>
+        <p:txBody>
+          <a:bodyPr/>
+          <a:lstStyle/>
+          <a:p>
+            <a:r>
+              <a:rPr lang="en-US" dirty="0"/>
+              <a:t>* Patients</a:t>
+            </a:r>
+          </a:p>
+          <a:p>
+            <a:r>
+              <a:rPr lang="en-US" dirty="0"/>
+              <a:t>On the patients page the user will see a list of all their assigned patients. When the user taps on one of the patients, the patient details page is displayed. On this page the user can view the patients dosage information and notes.</a:t>
+            </a:r>
+          </a:p>
+        </p:txBody>
+      </p:sp>
+      <p:sp>
+        <p:nvSpPr>
+          <p:cNvPr id="4" name="Slide Number Placeholder 3"/>
+          <p:cNvSpPr>
+            <a:spLocks noGrp="1"/>
+          </p:cNvSpPr>
+          <p:nvPr>
+            <p:ph type="sldNum" sz="quarter" idx="10"/>
+          </p:nvPr>
+        </p:nvSpPr>
+        <p:spPr/>
+        <p:txBody>
+          <a:bodyPr/>
+          <a:lstStyle/>
+          <a:p>
+            <a:fld id="{5DBDFD66-C54F-4B15-9351-98B5EC069B7B}" type="slidenum">
+              <a:rPr lang="en-AU" smtClean="0"/>
+              <a:t>6</a:t>
+            </a:fld>
+            <a:endParaRPr lang="en-AU"/>
+          </a:p>
+        </p:txBody>
+      </p:sp>
+    </p:spTree>
+    <p:extLst>
+      <p:ext uri="{BB962C8B-B14F-4D97-AF65-F5344CB8AC3E}">
+        <p14:creationId xmlns:p14="http://schemas.microsoft.com/office/powerpoint/2010/main" val="999817331"/>
+      </p:ext>
+    </p:extLst>
+  </p:cSld>
+  <p:clrMapOvr>
+    <a:masterClrMapping/>
+  </p:clrMapOvr>
+</p:notes>
+</file>
+
+<file path=ppt/notesSlides/notesSlide3.xml><?xml version="1.0" encoding="utf-8"?>
+<p:notes xmlns:a="http://schemas.openxmlformats.org/drawingml/2006/main" xmlns:r="http://schemas.openxmlformats.org/officeDocument/2006/relationships" xmlns:p="http://schemas.openxmlformats.org/presentationml/2006/main">
+  <p:cSld>
+    <p:spTree>
+      <p:nvGrpSpPr>
+        <p:cNvPr id="1" name=""/>
+        <p:cNvGrpSpPr/>
+        <p:nvPr/>
+      </p:nvGrpSpPr>
+      <p:grpSpPr>
+        <a:xfrm>
+          <a:off x="0" y="0"/>
+          <a:ext cx="0" cy="0"/>
+          <a:chOff x="0" y="0"/>
+          <a:chExt cx="0" cy="0"/>
+        </a:xfrm>
+      </p:grpSpPr>
+      <p:sp>
+        <p:nvSpPr>
+          <p:cNvPr id="2" name="Slide Image Placeholder 1"/>
+          <p:cNvSpPr>
+            <a:spLocks noGrp="1" noRot="1" noChangeAspect="1"/>
+          </p:cNvSpPr>
+          <p:nvPr>
+            <p:ph type="sldImg"/>
+          </p:nvPr>
+        </p:nvSpPr>
+        <p:spPr/>
+      </p:sp>
+      <p:sp>
+        <p:nvSpPr>
+          <p:cNvPr id="3" name="Notes Placeholder 2"/>
+          <p:cNvSpPr>
+            <a:spLocks noGrp="1"/>
+          </p:cNvSpPr>
+          <p:nvPr>
+            <p:ph type="body" idx="1"/>
+          </p:nvPr>
+        </p:nvSpPr>
+        <p:spPr/>
+        <p:txBody>
+          <a:bodyPr/>
+          <a:lstStyle/>
+          <a:p>
+            <a:r>
+              <a:rPr lang="en-US" dirty="0"/>
+              <a:t>* Notes</a:t>
+            </a:r>
+          </a:p>
+          <a:p>
+            <a:r>
+              <a:rPr lang="en-US" dirty="0"/>
+              <a:t>When the notes button is pressed, a list of all the patient notes are displayed. The user can tap to view or edit the note or create a new one by tapping the plus sign in the bottom right corner. When viewing a note the user can edit text and optionally add a photo. The photo will be displayed above the note text. The user also has the ability to scroll down to reveal more text. The text in the note can be cleared easily by shaking the phone.</a:t>
+            </a:r>
+            <a:endParaRPr lang="en-AU" dirty="0"/>
+          </a:p>
+        </p:txBody>
+      </p:sp>
+      <p:sp>
+        <p:nvSpPr>
+          <p:cNvPr id="4" name="Slide Number Placeholder 3"/>
+          <p:cNvSpPr>
+            <a:spLocks noGrp="1"/>
+          </p:cNvSpPr>
+          <p:nvPr>
+            <p:ph type="sldNum" sz="quarter" idx="10"/>
+          </p:nvPr>
+        </p:nvSpPr>
+        <p:spPr/>
+        <p:txBody>
+          <a:bodyPr/>
+          <a:lstStyle/>
+          <a:p>
+            <a:fld id="{5DBDFD66-C54F-4B15-9351-98B5EC069B7B}" type="slidenum">
+              <a:rPr lang="en-AU" smtClean="0"/>
+              <a:t>7</a:t>
+            </a:fld>
+            <a:endParaRPr lang="en-AU"/>
+          </a:p>
+        </p:txBody>
+      </p:sp>
+    </p:spTree>
+    <p:extLst>
+      <p:ext uri="{BB962C8B-B14F-4D97-AF65-F5344CB8AC3E}">
+        <p14:creationId xmlns:p14="http://schemas.microsoft.com/office/powerpoint/2010/main" val="3235990711"/>
+      </p:ext>
+    </p:extLst>
+  </p:cSld>
+  <p:clrMapOvr>
+    <a:masterClrMapping/>
+  </p:clrMapOvr>
+</p:notes>
 </file>
 
 <file path=ppt/slideLayouts/slideLayout1.xml><?xml version="1.0" encoding="utf-8"?>
@@ -838,7 +1504,7 @@
             <a:fld id="{B61BEF0D-F0BB-DE4B-95CE-6DB70DBA9567}" type="datetimeFigureOut">
               <a:rPr lang="en-US" dirty="0"/>
               <a:pPr/>
-              <a:t>8/30/2018</a:t>
+              <a:t>9/1/2018</a:t>
             </a:fld>
             <a:endParaRPr lang="en-US" dirty="0"/>
           </a:p>
@@ -1086,7 +1752,7 @@
             <a:fld id="{B61BEF0D-F0BB-DE4B-95CE-6DB70DBA9567}" type="datetimeFigureOut">
               <a:rPr lang="en-US" dirty="0"/>
               <a:pPr/>
-              <a:t>8/30/2018</a:t>
+              <a:t>9/1/2018</a:t>
             </a:fld>
             <a:endParaRPr lang="en-US" dirty="0"/>
           </a:p>
@@ -1397,7 +2063,7 @@
             <a:fld id="{B61BEF0D-F0BB-DE4B-95CE-6DB70DBA9567}" type="datetimeFigureOut">
               <a:rPr lang="en-US" dirty="0"/>
               <a:pPr/>
-              <a:t>8/30/2018</a:t>
+              <a:t>9/1/2018</a:t>
             </a:fld>
             <a:endParaRPr lang="en-US" dirty="0"/>
           </a:p>
@@ -1735,7 +2401,7 @@
             <a:fld id="{B61BEF0D-F0BB-DE4B-95CE-6DB70DBA9567}" type="datetimeFigureOut">
               <a:rPr lang="en-US" dirty="0"/>
               <a:pPr/>
-              <a:t>8/30/2018</a:t>
+              <a:t>9/1/2018</a:t>
             </a:fld>
             <a:endParaRPr lang="en-US" dirty="0"/>
           </a:p>
@@ -2046,7 +2712,7 @@
             <a:fld id="{B61BEF0D-F0BB-DE4B-95CE-6DB70DBA9567}" type="datetimeFigureOut">
               <a:rPr lang="en-US" dirty="0"/>
               <a:pPr/>
-              <a:t>8/30/2018</a:t>
+              <a:t>9/1/2018</a:t>
             </a:fld>
             <a:endParaRPr lang="en-US" dirty="0"/>
           </a:p>
@@ -2436,7 +3102,7 @@
             <a:fld id="{B61BEF0D-F0BB-DE4B-95CE-6DB70DBA9567}" type="datetimeFigureOut">
               <a:rPr lang="en-US" dirty="0"/>
               <a:pPr/>
-              <a:t>8/30/2018</a:t>
+              <a:t>9/1/2018</a:t>
             </a:fld>
             <a:endParaRPr lang="en-US" dirty="0"/>
           </a:p>
@@ -2602,7 +3268,7 @@
           <a:p>
             <a:fld id="{55C6B4A9-1611-4792-9094-5F34BCA07E0B}" type="datetimeFigureOut">
               <a:rPr lang="en-US" dirty="0"/>
-              <a:t>8/30/2018</a:t>
+              <a:t>9/1/2018</a:t>
             </a:fld>
             <a:endParaRPr lang="en-US" dirty="0"/>
           </a:p>
@@ -2778,7 +3444,7 @@
             <a:fld id="{B61BEF0D-F0BB-DE4B-95CE-6DB70DBA9567}" type="datetimeFigureOut">
               <a:rPr lang="en-US" dirty="0"/>
               <a:pPr/>
-              <a:t>8/30/2018</a:t>
+              <a:t>9/1/2018</a:t>
             </a:fld>
             <a:endParaRPr lang="en-US" dirty="0"/>
           </a:p>
@@ -2951,7 +3617,7 @@
             <a:fld id="{B61BEF0D-F0BB-DE4B-95CE-6DB70DBA9567}" type="datetimeFigureOut">
               <a:rPr lang="en-US" dirty="0"/>
               <a:pPr/>
-              <a:t>8/30/2018</a:t>
+              <a:t>9/1/2018</a:t>
             </a:fld>
             <a:endParaRPr lang="en-US" dirty="0"/>
           </a:p>
@@ -3195,7 +3861,7 @@
             <a:fld id="{B61BEF0D-F0BB-DE4B-95CE-6DB70DBA9567}" type="datetimeFigureOut">
               <a:rPr lang="en-US" dirty="0"/>
               <a:pPr/>
-              <a:t>8/30/2018</a:t>
+              <a:t>9/1/2018</a:t>
             </a:fld>
             <a:endParaRPr lang="en-US" dirty="0"/>
           </a:p>
@@ -3423,7 +4089,7 @@
           <a:p>
             <a:fld id="{EB712588-04B1-427B-82EE-E8DB90309F08}" type="datetimeFigureOut">
               <a:rPr lang="en-US" dirty="0"/>
-              <a:t>8/30/2018</a:t>
+              <a:t>9/1/2018</a:t>
             </a:fld>
             <a:endParaRPr lang="en-US" dirty="0"/>
           </a:p>
@@ -3793,7 +4459,7 @@
             <a:fld id="{B61BEF0D-F0BB-DE4B-95CE-6DB70DBA9567}" type="datetimeFigureOut">
               <a:rPr lang="en-US" dirty="0"/>
               <a:pPr/>
-              <a:t>8/30/2018</a:t>
+              <a:t>9/1/2018</a:t>
             </a:fld>
             <a:endParaRPr lang="en-US" dirty="0"/>
           </a:p>
@@ -3913,7 +4579,7 @@
             <a:fld id="{B61BEF0D-F0BB-DE4B-95CE-6DB70DBA9567}" type="datetimeFigureOut">
               <a:rPr lang="en-US" dirty="0"/>
               <a:pPr/>
-              <a:t>8/30/2018</a:t>
+              <a:t>9/1/2018</a:t>
             </a:fld>
             <a:endParaRPr lang="en-US" dirty="0"/>
           </a:p>
@@ -4005,7 +4671,7 @@
             <a:fld id="{B61BEF0D-F0BB-DE4B-95CE-6DB70DBA9567}" type="datetimeFigureOut">
               <a:rPr lang="en-US" dirty="0"/>
               <a:pPr/>
-              <a:t>8/30/2018</a:t>
+              <a:t>9/1/2018</a:t>
             </a:fld>
             <a:endParaRPr lang="en-US" dirty="0"/>
           </a:p>
@@ -4256,7 +4922,7 @@
           <a:p>
             <a:fld id="{42A54C80-263E-416B-A8E0-580EDEADCBDC}" type="datetimeFigureOut">
               <a:rPr lang="en-US" dirty="0"/>
-              <a:t>8/30/2018</a:t>
+              <a:t>9/1/2018</a:t>
             </a:fld>
             <a:endParaRPr lang="en-US" dirty="0"/>
           </a:p>
@@ -4515,7 +5181,7 @@
             <a:fld id="{B61BEF0D-F0BB-DE4B-95CE-6DB70DBA9567}" type="datetimeFigureOut">
               <a:rPr lang="en-US" dirty="0"/>
               <a:pPr/>
-              <a:t>8/30/2018</a:t>
+              <a:t>9/1/2018</a:t>
             </a:fld>
             <a:endParaRPr lang="en-US" dirty="0"/>
           </a:p>
@@ -5255,7 +5921,7 @@
             <a:fld id="{B61BEF0D-F0BB-DE4B-95CE-6DB70DBA9567}" type="datetimeFigureOut">
               <a:rPr lang="en-US" dirty="0"/>
               <a:pPr/>
-              <a:t>8/30/2018</a:t>
+              <a:t>9/1/2018</a:t>
             </a:fld>
             <a:endParaRPr lang="en-US" dirty="0"/>
           </a:p>
@@ -5791,11 +6457,17 @@
             <p:ph type="ctrTitle"/>
           </p:nvPr>
         </p:nvSpPr>
-        <p:spPr/>
+        <p:spPr>
+          <a:xfrm>
+            <a:off x="2986952" y="2043586"/>
+            <a:ext cx="7766936" cy="1646302"/>
+          </a:xfrm>
+        </p:spPr>
         <p:txBody>
           <a:bodyPr/>
           <a:lstStyle/>
           <a:p>
+            <a:pPr algn="l"/>
             <a:r>
               <a:rPr lang="en-AU" dirty="0" err="1"/>
               <a:t>MediClip</a:t>
@@ -5820,18 +6492,54 @@
             <p:ph type="subTitle" idx="1"/>
           </p:nvPr>
         </p:nvSpPr>
-        <p:spPr/>
+        <p:spPr>
+          <a:xfrm>
+            <a:off x="2986952" y="3689885"/>
+            <a:ext cx="7766936" cy="1096899"/>
+          </a:xfrm>
+        </p:spPr>
         <p:txBody>
           <a:bodyPr/>
           <a:lstStyle/>
           <a:p>
+            <a:pPr algn="l"/>
             <a:r>
               <a:rPr lang="en-AU" dirty="0"/>
-              <a:t>Francois Janse van Vuren, Karl Foley and Jacobus Janse van Vuren</a:t>
-            </a:r>
-          </a:p>
-        </p:txBody>
-      </p:sp>
+              <a:t>Francois Janse van Vuren, Karl Foley, Jacobus Janse van Vuren</a:t>
+            </a:r>
+          </a:p>
+        </p:txBody>
+      </p:sp>
+      <p:pic>
+        <p:nvPicPr>
+          <p:cNvPr id="5" name="Picture 4">
+            <a:extLst>
+              <a:ext uri="{FF2B5EF4-FFF2-40B4-BE49-F238E27FC236}">
+                <a16:creationId xmlns:a16="http://schemas.microsoft.com/office/drawing/2014/main" id="{E85CFE3E-FBE5-47C7-A9C9-C839C8BD4F56}"/>
+              </a:ext>
+            </a:extLst>
+          </p:cNvPr>
+          <p:cNvPicPr>
+            <a:picLocks noChangeAspect="1"/>
+          </p:cNvPicPr>
+          <p:nvPr/>
+        </p:nvPicPr>
+        <p:blipFill>
+          <a:blip r:embed="rId2"/>
+          <a:stretch>
+            <a:fillRect/>
+          </a:stretch>
+        </p:blipFill>
+        <p:spPr>
+          <a:xfrm>
+            <a:off x="1719403" y="2823187"/>
+            <a:ext cx="1267549" cy="1267549"/>
+          </a:xfrm>
+          <a:prstGeom prst="rect">
+            <a:avLst/>
+          </a:prstGeom>
+        </p:spPr>
+      </p:pic>
     </p:spTree>
     <p:extLst>
       <p:ext uri="{BB962C8B-B14F-4D97-AF65-F5344CB8AC3E}">
@@ -6156,6 +6864,1203 @@
     <p:extLst>
       <p:ext uri="{BB962C8B-B14F-4D97-AF65-F5344CB8AC3E}">
         <p14:creationId xmlns:p14="http://schemas.microsoft.com/office/powerpoint/2010/main" val="1238510084"/>
+      </p:ext>
+    </p:extLst>
+  </p:cSld>
+  <p:clrMapOvr>
+    <a:masterClrMapping/>
+  </p:clrMapOvr>
+</p:sld>
+</file>
+
+<file path=ppt/slides/slide5.xml><?xml version="1.0" encoding="utf-8"?>
+<p:sld xmlns:a="http://schemas.openxmlformats.org/drawingml/2006/main" xmlns:r="http://schemas.openxmlformats.org/officeDocument/2006/relationships" xmlns:p="http://schemas.openxmlformats.org/presentationml/2006/main">
+  <p:cSld>
+    <p:spTree>
+      <p:nvGrpSpPr>
+        <p:cNvPr id="1" name=""/>
+        <p:cNvGrpSpPr/>
+        <p:nvPr/>
+      </p:nvGrpSpPr>
+      <p:grpSpPr>
+        <a:xfrm>
+          <a:off x="0" y="0"/>
+          <a:ext cx="0" cy="0"/>
+          <a:chOff x="0" y="0"/>
+          <a:chExt cx="0" cy="0"/>
+        </a:xfrm>
+      </p:grpSpPr>
+      <p:sp>
+        <p:nvSpPr>
+          <p:cNvPr id="2" name="Title 1">
+            <a:extLst>
+              <a:ext uri="{FF2B5EF4-FFF2-40B4-BE49-F238E27FC236}">
+                <a16:creationId xmlns:a16="http://schemas.microsoft.com/office/drawing/2014/main" id="{13766A84-F656-4C8D-B04A-E6D8B44210A2}"/>
+              </a:ext>
+            </a:extLst>
+          </p:cNvPr>
+          <p:cNvSpPr>
+            <a:spLocks noGrp="1"/>
+          </p:cNvSpPr>
+          <p:nvPr>
+            <p:ph type="title"/>
+          </p:nvPr>
+        </p:nvSpPr>
+        <p:spPr>
+          <a:xfrm>
+            <a:off x="677334" y="609600"/>
+            <a:ext cx="8596668" cy="1320800"/>
+          </a:xfrm>
+        </p:spPr>
+        <p:txBody>
+          <a:bodyPr/>
+          <a:lstStyle/>
+          <a:p>
+            <a:r>
+              <a:rPr lang="en-US" dirty="0"/>
+              <a:t>User Interface</a:t>
+            </a:r>
+            <a:endParaRPr lang="en-AU" dirty="0"/>
+          </a:p>
+        </p:txBody>
+      </p:sp>
+      <p:pic>
+        <p:nvPicPr>
+          <p:cNvPr id="5" name="Content Placeholder 4">
+            <a:extLst>
+              <a:ext uri="{FF2B5EF4-FFF2-40B4-BE49-F238E27FC236}">
+                <a16:creationId xmlns:a16="http://schemas.microsoft.com/office/drawing/2014/main" id="{5F9F1A70-23D8-49E2-99B8-AB53D7B31636}"/>
+              </a:ext>
+            </a:extLst>
+          </p:cNvPr>
+          <p:cNvPicPr>
+            <a:picLocks noGrp="1" noChangeAspect="1"/>
+          </p:cNvPicPr>
+          <p:nvPr>
+            <p:ph idx="1"/>
+          </p:nvPr>
+        </p:nvPicPr>
+        <p:blipFill>
+          <a:blip r:embed="rId3"/>
+          <a:stretch>
+            <a:fillRect/>
+          </a:stretch>
+        </p:blipFill>
+        <p:spPr>
+          <a:xfrm>
+            <a:off x="3649944" y="1565306"/>
+            <a:ext cx="2704503" cy="4476421"/>
+          </a:xfrm>
+        </p:spPr>
+      </p:pic>
+      <p:pic>
+        <p:nvPicPr>
+          <p:cNvPr id="7" name="Picture 6">
+            <a:extLst>
+              <a:ext uri="{FF2B5EF4-FFF2-40B4-BE49-F238E27FC236}">
+                <a16:creationId xmlns:a16="http://schemas.microsoft.com/office/drawing/2014/main" id="{E78C5D78-08BF-4DAF-8EFB-52E7FC929933}"/>
+              </a:ext>
+            </a:extLst>
+          </p:cNvPr>
+          <p:cNvPicPr>
+            <a:picLocks noChangeAspect="1"/>
+          </p:cNvPicPr>
+          <p:nvPr/>
+        </p:nvPicPr>
+        <p:blipFill>
+          <a:blip r:embed="rId4"/>
+          <a:stretch>
+            <a:fillRect/>
+          </a:stretch>
+        </p:blipFill>
+        <p:spPr>
+          <a:xfrm>
+            <a:off x="677334" y="1565653"/>
+            <a:ext cx="2704295" cy="4476074"/>
+          </a:xfrm>
+          <a:prstGeom prst="rect">
+            <a:avLst/>
+          </a:prstGeom>
+        </p:spPr>
+      </p:pic>
+      <p:pic>
+        <p:nvPicPr>
+          <p:cNvPr id="9" name="Picture 8">
+            <a:extLst>
+              <a:ext uri="{FF2B5EF4-FFF2-40B4-BE49-F238E27FC236}">
+                <a16:creationId xmlns:a16="http://schemas.microsoft.com/office/drawing/2014/main" id="{24F75C59-39B0-4B9C-9F7E-3AAE464B8E1D}"/>
+              </a:ext>
+            </a:extLst>
+          </p:cNvPr>
+          <p:cNvPicPr>
+            <a:picLocks noChangeAspect="1"/>
+          </p:cNvPicPr>
+          <p:nvPr/>
+        </p:nvPicPr>
+        <p:blipFill>
+          <a:blip r:embed="rId5"/>
+          <a:stretch>
+            <a:fillRect/>
+          </a:stretch>
+        </p:blipFill>
+        <p:spPr>
+          <a:xfrm>
+            <a:off x="6622762" y="1565306"/>
+            <a:ext cx="2704505" cy="4476421"/>
+          </a:xfrm>
+          <a:prstGeom prst="rect">
+            <a:avLst/>
+          </a:prstGeom>
+        </p:spPr>
+      </p:pic>
+      <p:cxnSp>
+        <p:nvCxnSpPr>
+          <p:cNvPr id="12" name="Straight Arrow Connector 11">
+            <a:extLst>
+              <a:ext uri="{FF2B5EF4-FFF2-40B4-BE49-F238E27FC236}">
+                <a16:creationId xmlns:a16="http://schemas.microsoft.com/office/drawing/2014/main" id="{0340F3C0-34D4-4EF1-8753-D421FB72B98E}"/>
+              </a:ext>
+            </a:extLst>
+          </p:cNvPr>
+          <p:cNvCxnSpPr>
+            <a:cxnSpLocks/>
+          </p:cNvCxnSpPr>
+          <p:nvPr/>
+        </p:nvCxnSpPr>
+        <p:spPr>
+          <a:xfrm>
+            <a:off x="6622762" y="1359568"/>
+            <a:ext cx="193127" cy="415090"/>
+          </a:xfrm>
+          <a:prstGeom prst="straightConnector1">
+            <a:avLst/>
+          </a:prstGeom>
+          <a:ln>
+            <a:tailEnd type="triangle"/>
+          </a:ln>
+        </p:spPr>
+        <p:style>
+          <a:lnRef idx="1">
+            <a:schemeClr val="accent1"/>
+          </a:lnRef>
+          <a:fillRef idx="0">
+            <a:schemeClr val="accent1"/>
+          </a:fillRef>
+          <a:effectRef idx="0">
+            <a:schemeClr val="accent1"/>
+          </a:effectRef>
+          <a:fontRef idx="minor">
+            <a:schemeClr val="tx1"/>
+          </a:fontRef>
+        </p:style>
+      </p:cxnSp>
+      <p:sp>
+        <p:nvSpPr>
+          <p:cNvPr id="13" name="TextBox 12">
+            <a:extLst>
+              <a:ext uri="{FF2B5EF4-FFF2-40B4-BE49-F238E27FC236}">
+                <a16:creationId xmlns:a16="http://schemas.microsoft.com/office/drawing/2014/main" id="{4FAF6712-CC29-4B76-8D0B-1497ADF48C23}"/>
+              </a:ext>
+            </a:extLst>
+          </p:cNvPr>
+          <p:cNvSpPr txBox="1"/>
+          <p:nvPr/>
+        </p:nvSpPr>
+        <p:spPr>
+          <a:xfrm>
+            <a:off x="4794585" y="990236"/>
+            <a:ext cx="3454792" cy="369332"/>
+          </a:xfrm>
+          <a:prstGeom prst="rect">
+            <a:avLst/>
+          </a:prstGeom>
+          <a:noFill/>
+        </p:spPr>
+        <p:txBody>
+          <a:bodyPr wrap="none" rtlCol="0">
+            <a:spAutoFit/>
+          </a:bodyPr>
+          <a:lstStyle/>
+          <a:p>
+            <a:r>
+              <a:rPr lang="en-US" dirty="0"/>
+              <a:t>Menu available from all screens</a:t>
+            </a:r>
+            <a:endParaRPr lang="en-AU" dirty="0"/>
+          </a:p>
+        </p:txBody>
+      </p:sp>
+      <p:cxnSp>
+        <p:nvCxnSpPr>
+          <p:cNvPr id="18" name="Straight Arrow Connector 17">
+            <a:extLst>
+              <a:ext uri="{FF2B5EF4-FFF2-40B4-BE49-F238E27FC236}">
+                <a16:creationId xmlns:a16="http://schemas.microsoft.com/office/drawing/2014/main" id="{B7BD9CC8-5E27-4965-80E1-3594D15B7A9C}"/>
+              </a:ext>
+            </a:extLst>
+          </p:cNvPr>
+          <p:cNvCxnSpPr>
+            <a:cxnSpLocks/>
+          </p:cNvCxnSpPr>
+          <p:nvPr/>
+        </p:nvCxnSpPr>
+        <p:spPr>
+          <a:xfrm flipH="1" flipV="1">
+            <a:off x="1419727" y="5913522"/>
+            <a:ext cx="397041" cy="409073"/>
+          </a:xfrm>
+          <a:prstGeom prst="straightConnector1">
+            <a:avLst/>
+          </a:prstGeom>
+          <a:ln>
+            <a:tailEnd type="triangle"/>
+          </a:ln>
+        </p:spPr>
+        <p:style>
+          <a:lnRef idx="1">
+            <a:schemeClr val="accent1"/>
+          </a:lnRef>
+          <a:fillRef idx="0">
+            <a:schemeClr val="accent1"/>
+          </a:fillRef>
+          <a:effectRef idx="0">
+            <a:schemeClr val="accent1"/>
+          </a:effectRef>
+          <a:fontRef idx="minor">
+            <a:schemeClr val="tx1"/>
+          </a:fontRef>
+        </p:style>
+      </p:cxnSp>
+      <p:sp>
+        <p:nvSpPr>
+          <p:cNvPr id="25" name="TextBox 24">
+            <a:extLst>
+              <a:ext uri="{FF2B5EF4-FFF2-40B4-BE49-F238E27FC236}">
+                <a16:creationId xmlns:a16="http://schemas.microsoft.com/office/drawing/2014/main" id="{B7B9C228-6A07-429F-AFEB-32A83CA4FE00}"/>
+              </a:ext>
+            </a:extLst>
+          </p:cNvPr>
+          <p:cNvSpPr txBox="1"/>
+          <p:nvPr/>
+        </p:nvSpPr>
+        <p:spPr>
+          <a:xfrm>
+            <a:off x="1816768" y="6062799"/>
+            <a:ext cx="2396810" cy="646331"/>
+          </a:xfrm>
+          <a:prstGeom prst="rect">
+            <a:avLst/>
+          </a:prstGeom>
+          <a:noFill/>
+        </p:spPr>
+        <p:txBody>
+          <a:bodyPr wrap="none" rtlCol="0">
+            <a:spAutoFit/>
+          </a:bodyPr>
+          <a:lstStyle/>
+          <a:p>
+            <a:r>
+              <a:rPr lang="en-US" dirty="0"/>
+              <a:t>Back button provided</a:t>
+            </a:r>
+          </a:p>
+          <a:p>
+            <a:r>
+              <a:rPr lang="en-US" dirty="0"/>
+              <a:t>by Android OS</a:t>
+            </a:r>
+            <a:endParaRPr lang="en-AU" dirty="0"/>
+          </a:p>
+        </p:txBody>
+      </p:sp>
+      <p:cxnSp>
+        <p:nvCxnSpPr>
+          <p:cNvPr id="27" name="Straight Arrow Connector 26">
+            <a:extLst>
+              <a:ext uri="{FF2B5EF4-FFF2-40B4-BE49-F238E27FC236}">
+                <a16:creationId xmlns:a16="http://schemas.microsoft.com/office/drawing/2014/main" id="{EE31F23F-D3AD-48D3-A46D-2DBC07CCEF15}"/>
+              </a:ext>
+            </a:extLst>
+          </p:cNvPr>
+          <p:cNvCxnSpPr>
+            <a:cxnSpLocks/>
+          </p:cNvCxnSpPr>
+          <p:nvPr/>
+        </p:nvCxnSpPr>
+        <p:spPr>
+          <a:xfrm flipH="1" flipV="1">
+            <a:off x="4544463" y="3753853"/>
+            <a:ext cx="743417" cy="2568743"/>
+          </a:xfrm>
+          <a:prstGeom prst="straightConnector1">
+            <a:avLst/>
+          </a:prstGeom>
+          <a:ln>
+            <a:tailEnd type="triangle"/>
+          </a:ln>
+        </p:spPr>
+        <p:style>
+          <a:lnRef idx="1">
+            <a:schemeClr val="accent1"/>
+          </a:lnRef>
+          <a:fillRef idx="0">
+            <a:schemeClr val="accent1"/>
+          </a:fillRef>
+          <a:effectRef idx="0">
+            <a:schemeClr val="accent1"/>
+          </a:effectRef>
+          <a:fontRef idx="minor">
+            <a:schemeClr val="tx1"/>
+          </a:fontRef>
+        </p:style>
+      </p:cxnSp>
+      <p:sp>
+        <p:nvSpPr>
+          <p:cNvPr id="31" name="TextBox 30">
+            <a:extLst>
+              <a:ext uri="{FF2B5EF4-FFF2-40B4-BE49-F238E27FC236}">
+                <a16:creationId xmlns:a16="http://schemas.microsoft.com/office/drawing/2014/main" id="{59B84983-34FD-48D7-B103-866749EDCDF1}"/>
+              </a:ext>
+            </a:extLst>
+          </p:cNvPr>
+          <p:cNvSpPr txBox="1"/>
+          <p:nvPr/>
+        </p:nvSpPr>
+        <p:spPr>
+          <a:xfrm>
+            <a:off x="5251472" y="6053759"/>
+            <a:ext cx="2284728" cy="646331"/>
+          </a:xfrm>
+          <a:prstGeom prst="rect">
+            <a:avLst/>
+          </a:prstGeom>
+          <a:noFill/>
+        </p:spPr>
+        <p:txBody>
+          <a:bodyPr wrap="none" rtlCol="0">
+            <a:spAutoFit/>
+          </a:bodyPr>
+          <a:lstStyle/>
+          <a:p>
+            <a:r>
+              <a:rPr lang="en-US" dirty="0"/>
+              <a:t>Tap to view patients</a:t>
+            </a:r>
+          </a:p>
+          <a:p>
+            <a:r>
+              <a:rPr lang="en-US" dirty="0"/>
+              <a:t>In ward</a:t>
+            </a:r>
+            <a:endParaRPr lang="en-AU" dirty="0"/>
+          </a:p>
+        </p:txBody>
+      </p:sp>
+    </p:spTree>
+    <p:extLst>
+      <p:ext uri="{BB962C8B-B14F-4D97-AF65-F5344CB8AC3E}">
+        <p14:creationId xmlns:p14="http://schemas.microsoft.com/office/powerpoint/2010/main" val="432667526"/>
+      </p:ext>
+    </p:extLst>
+  </p:cSld>
+  <p:clrMapOvr>
+    <a:masterClrMapping/>
+  </p:clrMapOvr>
+</p:sld>
+</file>
+
+<file path=ppt/slides/slide6.xml><?xml version="1.0" encoding="utf-8"?>
+<p:sld xmlns:a="http://schemas.openxmlformats.org/drawingml/2006/main" xmlns:r="http://schemas.openxmlformats.org/officeDocument/2006/relationships" xmlns:p="http://schemas.openxmlformats.org/presentationml/2006/main">
+  <p:cSld>
+    <p:spTree>
+      <p:nvGrpSpPr>
+        <p:cNvPr id="1" name=""/>
+        <p:cNvGrpSpPr/>
+        <p:nvPr/>
+      </p:nvGrpSpPr>
+      <p:grpSpPr>
+        <a:xfrm>
+          <a:off x="0" y="0"/>
+          <a:ext cx="0" cy="0"/>
+          <a:chOff x="0" y="0"/>
+          <a:chExt cx="0" cy="0"/>
+        </a:xfrm>
+      </p:grpSpPr>
+      <p:sp>
+        <p:nvSpPr>
+          <p:cNvPr id="2" name="Title 1">
+            <a:extLst>
+              <a:ext uri="{FF2B5EF4-FFF2-40B4-BE49-F238E27FC236}">
+                <a16:creationId xmlns:a16="http://schemas.microsoft.com/office/drawing/2014/main" id="{E60F1099-315E-43DF-84F8-3DBA64C3C368}"/>
+              </a:ext>
+            </a:extLst>
+          </p:cNvPr>
+          <p:cNvSpPr>
+            <a:spLocks noGrp="1"/>
+          </p:cNvSpPr>
+          <p:nvPr>
+            <p:ph type="title"/>
+          </p:nvPr>
+        </p:nvSpPr>
+        <p:spPr/>
+        <p:txBody>
+          <a:bodyPr/>
+          <a:lstStyle/>
+          <a:p>
+            <a:r>
+              <a:rPr lang="en-US" dirty="0"/>
+              <a:t>User Interface</a:t>
+            </a:r>
+            <a:endParaRPr lang="en-AU" dirty="0"/>
+          </a:p>
+        </p:txBody>
+      </p:sp>
+      <p:pic>
+        <p:nvPicPr>
+          <p:cNvPr id="17" name="Picture 16">
+            <a:extLst>
+              <a:ext uri="{FF2B5EF4-FFF2-40B4-BE49-F238E27FC236}">
+                <a16:creationId xmlns:a16="http://schemas.microsoft.com/office/drawing/2014/main" id="{8D70EC74-A4D9-4CBA-9A9E-CA8B77599622}"/>
+              </a:ext>
+            </a:extLst>
+          </p:cNvPr>
+          <p:cNvPicPr>
+            <a:picLocks noChangeAspect="1"/>
+          </p:cNvPicPr>
+          <p:nvPr/>
+        </p:nvPicPr>
+        <p:blipFill>
+          <a:blip r:embed="rId3"/>
+          <a:stretch>
+            <a:fillRect/>
+          </a:stretch>
+        </p:blipFill>
+        <p:spPr>
+          <a:xfrm>
+            <a:off x="1137891" y="1544205"/>
+            <a:ext cx="2702706" cy="4476076"/>
+          </a:xfrm>
+          <a:prstGeom prst="rect">
+            <a:avLst/>
+          </a:prstGeom>
+        </p:spPr>
+      </p:pic>
+      <p:pic>
+        <p:nvPicPr>
+          <p:cNvPr id="18" name="Picture 17">
+            <a:extLst>
+              <a:ext uri="{FF2B5EF4-FFF2-40B4-BE49-F238E27FC236}">
+                <a16:creationId xmlns:a16="http://schemas.microsoft.com/office/drawing/2014/main" id="{ADB59777-82C5-4537-BE4F-20D5A37E1914}"/>
+              </a:ext>
+            </a:extLst>
+          </p:cNvPr>
+          <p:cNvPicPr>
+            <a:picLocks noChangeAspect="1"/>
+          </p:cNvPicPr>
+          <p:nvPr/>
+        </p:nvPicPr>
+        <p:blipFill>
+          <a:blip r:embed="rId4"/>
+          <a:stretch>
+            <a:fillRect/>
+          </a:stretch>
+        </p:blipFill>
+        <p:spPr>
+          <a:xfrm>
+            <a:off x="4977257" y="1544205"/>
+            <a:ext cx="2702706" cy="4476076"/>
+          </a:xfrm>
+          <a:prstGeom prst="rect">
+            <a:avLst/>
+          </a:prstGeom>
+        </p:spPr>
+      </p:pic>
+      <p:cxnSp>
+        <p:nvCxnSpPr>
+          <p:cNvPr id="20" name="Straight Arrow Connector 19">
+            <a:extLst>
+              <a:ext uri="{FF2B5EF4-FFF2-40B4-BE49-F238E27FC236}">
+                <a16:creationId xmlns:a16="http://schemas.microsoft.com/office/drawing/2014/main" id="{0AB80B2A-B05A-4C1F-ACA9-2A432AAE0E93}"/>
+              </a:ext>
+            </a:extLst>
+          </p:cNvPr>
+          <p:cNvCxnSpPr>
+            <a:cxnSpLocks/>
+          </p:cNvCxnSpPr>
+          <p:nvPr/>
+        </p:nvCxnSpPr>
+        <p:spPr>
+          <a:xfrm flipH="1">
+            <a:off x="7032459" y="3699711"/>
+            <a:ext cx="848225" cy="992605"/>
+          </a:xfrm>
+          <a:prstGeom prst="straightConnector1">
+            <a:avLst/>
+          </a:prstGeom>
+          <a:ln>
+            <a:tailEnd type="triangle"/>
+          </a:ln>
+        </p:spPr>
+        <p:style>
+          <a:lnRef idx="1">
+            <a:schemeClr val="accent1"/>
+          </a:lnRef>
+          <a:fillRef idx="0">
+            <a:schemeClr val="accent1"/>
+          </a:fillRef>
+          <a:effectRef idx="0">
+            <a:schemeClr val="accent1"/>
+          </a:effectRef>
+          <a:fontRef idx="minor">
+            <a:schemeClr val="tx1"/>
+          </a:fontRef>
+        </p:style>
+      </p:cxnSp>
+      <p:sp>
+        <p:nvSpPr>
+          <p:cNvPr id="21" name="TextBox 20">
+            <a:extLst>
+              <a:ext uri="{FF2B5EF4-FFF2-40B4-BE49-F238E27FC236}">
+                <a16:creationId xmlns:a16="http://schemas.microsoft.com/office/drawing/2014/main" id="{5DDE3B52-19D4-43FF-A9D6-071DC96333C8}"/>
+              </a:ext>
+            </a:extLst>
+          </p:cNvPr>
+          <p:cNvSpPr txBox="1"/>
+          <p:nvPr/>
+        </p:nvSpPr>
+        <p:spPr>
+          <a:xfrm>
+            <a:off x="7679963" y="3098132"/>
+            <a:ext cx="2392001" cy="646331"/>
+          </a:xfrm>
+          <a:prstGeom prst="rect">
+            <a:avLst/>
+          </a:prstGeom>
+          <a:noFill/>
+        </p:spPr>
+        <p:txBody>
+          <a:bodyPr wrap="none" rtlCol="0">
+            <a:spAutoFit/>
+          </a:bodyPr>
+          <a:lstStyle/>
+          <a:p>
+            <a:r>
+              <a:rPr lang="en-US" dirty="0"/>
+              <a:t>Displayed as message</a:t>
+            </a:r>
+          </a:p>
+          <a:p>
+            <a:r>
+              <a:rPr lang="en-US" dirty="0"/>
+              <a:t>box</a:t>
+            </a:r>
+            <a:endParaRPr lang="en-AU" dirty="0"/>
+          </a:p>
+        </p:txBody>
+      </p:sp>
+      <p:cxnSp>
+        <p:nvCxnSpPr>
+          <p:cNvPr id="24" name="Straight Arrow Connector 23">
+            <a:extLst>
+              <a:ext uri="{FF2B5EF4-FFF2-40B4-BE49-F238E27FC236}">
+                <a16:creationId xmlns:a16="http://schemas.microsoft.com/office/drawing/2014/main" id="{DDBB7137-D451-4986-BDBD-6D05ADDFD5C0}"/>
+              </a:ext>
+            </a:extLst>
+          </p:cNvPr>
+          <p:cNvCxnSpPr>
+            <a:cxnSpLocks/>
+          </p:cNvCxnSpPr>
+          <p:nvPr/>
+        </p:nvCxnSpPr>
+        <p:spPr>
+          <a:xfrm flipH="1" flipV="1">
+            <a:off x="2731169" y="4445669"/>
+            <a:ext cx="902368" cy="1802731"/>
+          </a:xfrm>
+          <a:prstGeom prst="straightConnector1">
+            <a:avLst/>
+          </a:prstGeom>
+          <a:ln>
+            <a:tailEnd type="triangle"/>
+          </a:ln>
+        </p:spPr>
+        <p:style>
+          <a:lnRef idx="1">
+            <a:schemeClr val="accent1"/>
+          </a:lnRef>
+          <a:fillRef idx="0">
+            <a:schemeClr val="accent1"/>
+          </a:fillRef>
+          <a:effectRef idx="0">
+            <a:schemeClr val="accent1"/>
+          </a:effectRef>
+          <a:fontRef idx="minor">
+            <a:schemeClr val="tx1"/>
+          </a:fontRef>
+        </p:style>
+      </p:cxnSp>
+      <p:sp>
+        <p:nvSpPr>
+          <p:cNvPr id="28" name="TextBox 27">
+            <a:extLst>
+              <a:ext uri="{FF2B5EF4-FFF2-40B4-BE49-F238E27FC236}">
+                <a16:creationId xmlns:a16="http://schemas.microsoft.com/office/drawing/2014/main" id="{33E79B34-B7FB-481D-98FD-B3AB05C33734}"/>
+              </a:ext>
+            </a:extLst>
+          </p:cNvPr>
+          <p:cNvSpPr txBox="1"/>
+          <p:nvPr/>
+        </p:nvSpPr>
+        <p:spPr>
+          <a:xfrm>
+            <a:off x="3254543" y="6186236"/>
+            <a:ext cx="2954783" cy="369332"/>
+          </a:xfrm>
+          <a:prstGeom prst="rect">
+            <a:avLst/>
+          </a:prstGeom>
+          <a:noFill/>
+        </p:spPr>
+        <p:txBody>
+          <a:bodyPr wrap="none" rtlCol="0">
+            <a:spAutoFit/>
+          </a:bodyPr>
+          <a:lstStyle/>
+          <a:p>
+            <a:r>
+              <a:rPr lang="en-US" dirty="0"/>
+              <a:t>Tap to view patient details</a:t>
+            </a:r>
+            <a:endParaRPr lang="en-AU" dirty="0"/>
+          </a:p>
+        </p:txBody>
+      </p:sp>
+    </p:spTree>
+    <p:extLst>
+      <p:ext uri="{BB962C8B-B14F-4D97-AF65-F5344CB8AC3E}">
+        <p14:creationId xmlns:p14="http://schemas.microsoft.com/office/powerpoint/2010/main" val="3683058419"/>
+      </p:ext>
+    </p:extLst>
+  </p:cSld>
+  <p:clrMapOvr>
+    <a:masterClrMapping/>
+  </p:clrMapOvr>
+</p:sld>
+</file>
+
+<file path=ppt/slides/slide7.xml><?xml version="1.0" encoding="utf-8"?>
+<p:sld xmlns:a="http://schemas.openxmlformats.org/drawingml/2006/main" xmlns:r="http://schemas.openxmlformats.org/officeDocument/2006/relationships" xmlns:p="http://schemas.openxmlformats.org/presentationml/2006/main">
+  <p:cSld>
+    <p:spTree>
+      <p:nvGrpSpPr>
+        <p:cNvPr id="1" name=""/>
+        <p:cNvGrpSpPr/>
+        <p:nvPr/>
+      </p:nvGrpSpPr>
+      <p:grpSpPr>
+        <a:xfrm>
+          <a:off x="0" y="0"/>
+          <a:ext cx="0" cy="0"/>
+          <a:chOff x="0" y="0"/>
+          <a:chExt cx="0" cy="0"/>
+        </a:xfrm>
+      </p:grpSpPr>
+      <p:sp>
+        <p:nvSpPr>
+          <p:cNvPr id="2" name="Title 1">
+            <a:extLst>
+              <a:ext uri="{FF2B5EF4-FFF2-40B4-BE49-F238E27FC236}">
+                <a16:creationId xmlns:a16="http://schemas.microsoft.com/office/drawing/2014/main" id="{D57928AA-F721-49A1-8CEC-3C48BB95A5EB}"/>
+              </a:ext>
+            </a:extLst>
+          </p:cNvPr>
+          <p:cNvSpPr>
+            <a:spLocks noGrp="1"/>
+          </p:cNvSpPr>
+          <p:nvPr>
+            <p:ph type="title"/>
+          </p:nvPr>
+        </p:nvSpPr>
+        <p:spPr/>
+        <p:txBody>
+          <a:bodyPr/>
+          <a:lstStyle/>
+          <a:p>
+            <a:r>
+              <a:rPr lang="en-US" dirty="0"/>
+              <a:t>User Interface</a:t>
+            </a:r>
+            <a:endParaRPr lang="en-AU" dirty="0"/>
+          </a:p>
+        </p:txBody>
+      </p:sp>
+      <p:pic>
+        <p:nvPicPr>
+          <p:cNvPr id="4" name="Picture 3">
+            <a:extLst>
+              <a:ext uri="{FF2B5EF4-FFF2-40B4-BE49-F238E27FC236}">
+                <a16:creationId xmlns:a16="http://schemas.microsoft.com/office/drawing/2014/main" id="{2835D140-DBBB-4B3F-850F-B9C78A912BFB}"/>
+              </a:ext>
+            </a:extLst>
+          </p:cNvPr>
+          <p:cNvPicPr>
+            <a:picLocks noChangeAspect="1"/>
+          </p:cNvPicPr>
+          <p:nvPr/>
+        </p:nvPicPr>
+        <p:blipFill>
+          <a:blip r:embed="rId3"/>
+          <a:stretch>
+            <a:fillRect/>
+          </a:stretch>
+        </p:blipFill>
+        <p:spPr>
+          <a:xfrm>
+            <a:off x="1137891" y="1544205"/>
+            <a:ext cx="2704296" cy="4476076"/>
+          </a:xfrm>
+          <a:prstGeom prst="rect">
+            <a:avLst/>
+          </a:prstGeom>
+        </p:spPr>
+      </p:pic>
+      <p:pic>
+        <p:nvPicPr>
+          <p:cNvPr id="5" name="Picture 4">
+            <a:extLst>
+              <a:ext uri="{FF2B5EF4-FFF2-40B4-BE49-F238E27FC236}">
+                <a16:creationId xmlns:a16="http://schemas.microsoft.com/office/drawing/2014/main" id="{D32F0747-AAF5-4FBE-8A86-765BDD467956}"/>
+              </a:ext>
+            </a:extLst>
+          </p:cNvPr>
+          <p:cNvPicPr>
+            <a:picLocks noChangeAspect="1"/>
+          </p:cNvPicPr>
+          <p:nvPr/>
+        </p:nvPicPr>
+        <p:blipFill>
+          <a:blip r:embed="rId4"/>
+          <a:stretch>
+            <a:fillRect/>
+          </a:stretch>
+        </p:blipFill>
+        <p:spPr>
+          <a:xfrm>
+            <a:off x="4975667" y="1544205"/>
+            <a:ext cx="2704296" cy="4476076"/>
+          </a:xfrm>
+          <a:prstGeom prst="rect">
+            <a:avLst/>
+          </a:prstGeom>
+        </p:spPr>
+      </p:pic>
+      <p:cxnSp>
+        <p:nvCxnSpPr>
+          <p:cNvPr id="7" name="Straight Arrow Connector 6">
+            <a:extLst>
+              <a:ext uri="{FF2B5EF4-FFF2-40B4-BE49-F238E27FC236}">
+                <a16:creationId xmlns:a16="http://schemas.microsoft.com/office/drawing/2014/main" id="{7BA3E9CF-65B9-412A-B3F7-2AB993E04DE6}"/>
+              </a:ext>
+            </a:extLst>
+          </p:cNvPr>
+          <p:cNvCxnSpPr>
+            <a:cxnSpLocks/>
+          </p:cNvCxnSpPr>
+          <p:nvPr/>
+        </p:nvCxnSpPr>
+        <p:spPr>
+          <a:xfrm>
+            <a:off x="7742321" y="2382253"/>
+            <a:ext cx="0" cy="1768641"/>
+          </a:xfrm>
+          <a:prstGeom prst="straightConnector1">
+            <a:avLst/>
+          </a:prstGeom>
+          <a:ln>
+            <a:tailEnd type="triangle"/>
+          </a:ln>
+        </p:spPr>
+        <p:style>
+          <a:lnRef idx="1">
+            <a:schemeClr val="accent1"/>
+          </a:lnRef>
+          <a:fillRef idx="0">
+            <a:schemeClr val="accent1"/>
+          </a:fillRef>
+          <a:effectRef idx="0">
+            <a:schemeClr val="accent1"/>
+          </a:effectRef>
+          <a:fontRef idx="minor">
+            <a:schemeClr val="tx1"/>
+          </a:fontRef>
+        </p:style>
+      </p:cxnSp>
+      <p:sp>
+        <p:nvSpPr>
+          <p:cNvPr id="8" name="TextBox 7">
+            <a:extLst>
+              <a:ext uri="{FF2B5EF4-FFF2-40B4-BE49-F238E27FC236}">
+                <a16:creationId xmlns:a16="http://schemas.microsoft.com/office/drawing/2014/main" id="{7C0343B8-08E8-48E3-925E-2229E8AFE5CF}"/>
+              </a:ext>
+            </a:extLst>
+          </p:cNvPr>
+          <p:cNvSpPr txBox="1"/>
+          <p:nvPr/>
+        </p:nvSpPr>
+        <p:spPr>
+          <a:xfrm>
+            <a:off x="7742321" y="2733719"/>
+            <a:ext cx="1728358" cy="646331"/>
+          </a:xfrm>
+          <a:prstGeom prst="rect">
+            <a:avLst/>
+          </a:prstGeom>
+          <a:noFill/>
+        </p:spPr>
+        <p:txBody>
+          <a:bodyPr wrap="none" rtlCol="0">
+            <a:spAutoFit/>
+          </a:bodyPr>
+          <a:lstStyle/>
+          <a:p>
+            <a:r>
+              <a:rPr lang="en-US" dirty="0"/>
+              <a:t>Scroll down to </a:t>
+            </a:r>
+          </a:p>
+          <a:p>
+            <a:r>
+              <a:rPr lang="en-US" dirty="0"/>
+              <a:t>see text</a:t>
+            </a:r>
+            <a:endParaRPr lang="en-AU" dirty="0"/>
+          </a:p>
+        </p:txBody>
+      </p:sp>
+      <p:cxnSp>
+        <p:nvCxnSpPr>
+          <p:cNvPr id="10" name="Straight Arrow Connector 9">
+            <a:extLst>
+              <a:ext uri="{FF2B5EF4-FFF2-40B4-BE49-F238E27FC236}">
+                <a16:creationId xmlns:a16="http://schemas.microsoft.com/office/drawing/2014/main" id="{CEC8472C-E95E-4950-AF6B-A7F30F746A99}"/>
+              </a:ext>
+            </a:extLst>
+          </p:cNvPr>
+          <p:cNvCxnSpPr>
+            <a:cxnSpLocks/>
+          </p:cNvCxnSpPr>
+          <p:nvPr/>
+        </p:nvCxnSpPr>
+        <p:spPr>
+          <a:xfrm flipV="1">
+            <a:off x="4564580" y="5313797"/>
+            <a:ext cx="554857" cy="822308"/>
+          </a:xfrm>
+          <a:prstGeom prst="straightConnector1">
+            <a:avLst/>
+          </a:prstGeom>
+          <a:ln>
+            <a:tailEnd type="triangle"/>
+          </a:ln>
+        </p:spPr>
+        <p:style>
+          <a:lnRef idx="1">
+            <a:schemeClr val="accent1"/>
+          </a:lnRef>
+          <a:fillRef idx="0">
+            <a:schemeClr val="accent1"/>
+          </a:fillRef>
+          <a:effectRef idx="0">
+            <a:schemeClr val="accent1"/>
+          </a:effectRef>
+          <a:fontRef idx="minor">
+            <a:schemeClr val="tx1"/>
+          </a:fontRef>
+        </p:style>
+      </p:cxnSp>
+      <p:sp>
+        <p:nvSpPr>
+          <p:cNvPr id="17" name="TextBox 16">
+            <a:extLst>
+              <a:ext uri="{FF2B5EF4-FFF2-40B4-BE49-F238E27FC236}">
+                <a16:creationId xmlns:a16="http://schemas.microsoft.com/office/drawing/2014/main" id="{1CD1A7BA-6902-406F-99AB-379A6C8422A0}"/>
+              </a:ext>
+            </a:extLst>
+          </p:cNvPr>
+          <p:cNvSpPr txBox="1"/>
+          <p:nvPr/>
+        </p:nvSpPr>
+        <p:spPr>
+          <a:xfrm>
+            <a:off x="3960894" y="6063779"/>
+            <a:ext cx="2554033" cy="646331"/>
+          </a:xfrm>
+          <a:prstGeom prst="rect">
+            <a:avLst/>
+          </a:prstGeom>
+          <a:noFill/>
+        </p:spPr>
+        <p:txBody>
+          <a:bodyPr wrap="none" rtlCol="0">
+            <a:spAutoFit/>
+          </a:bodyPr>
+          <a:lstStyle/>
+          <a:p>
+            <a:r>
+              <a:rPr lang="en-US" dirty="0"/>
+              <a:t>Shake to clear text</a:t>
+            </a:r>
+          </a:p>
+          <a:p>
+            <a:r>
+              <a:rPr lang="en-US" dirty="0"/>
+              <a:t>Tap on text box to edit</a:t>
+            </a:r>
+            <a:endParaRPr lang="en-AU" dirty="0"/>
+          </a:p>
+        </p:txBody>
+      </p:sp>
+      <p:cxnSp>
+        <p:nvCxnSpPr>
+          <p:cNvPr id="25" name="Straight Arrow Connector 24">
+            <a:extLst>
+              <a:ext uri="{FF2B5EF4-FFF2-40B4-BE49-F238E27FC236}">
+                <a16:creationId xmlns:a16="http://schemas.microsoft.com/office/drawing/2014/main" id="{D39D4218-31B1-4675-B6B1-08878A9B0B5A}"/>
+              </a:ext>
+            </a:extLst>
+          </p:cNvPr>
+          <p:cNvCxnSpPr>
+            <a:cxnSpLocks/>
+          </p:cNvCxnSpPr>
+          <p:nvPr/>
+        </p:nvCxnSpPr>
+        <p:spPr>
+          <a:xfrm flipH="1">
+            <a:off x="7423484" y="4860758"/>
+            <a:ext cx="637674" cy="318837"/>
+          </a:xfrm>
+          <a:prstGeom prst="straightConnector1">
+            <a:avLst/>
+          </a:prstGeom>
+          <a:ln>
+            <a:tailEnd type="triangle"/>
+          </a:ln>
+        </p:spPr>
+        <p:style>
+          <a:lnRef idx="1">
+            <a:schemeClr val="accent1"/>
+          </a:lnRef>
+          <a:fillRef idx="0">
+            <a:schemeClr val="accent1"/>
+          </a:fillRef>
+          <a:effectRef idx="0">
+            <a:schemeClr val="accent1"/>
+          </a:effectRef>
+          <a:fontRef idx="minor">
+            <a:schemeClr val="tx1"/>
+          </a:fontRef>
+        </p:style>
+      </p:cxnSp>
+      <p:sp>
+        <p:nvSpPr>
+          <p:cNvPr id="27" name="TextBox 26">
+            <a:extLst>
+              <a:ext uri="{FF2B5EF4-FFF2-40B4-BE49-F238E27FC236}">
+                <a16:creationId xmlns:a16="http://schemas.microsoft.com/office/drawing/2014/main" id="{00CFEF42-D907-4471-AC6D-2A3959E7A952}"/>
+              </a:ext>
+            </a:extLst>
+          </p:cNvPr>
+          <p:cNvSpPr txBox="1"/>
+          <p:nvPr/>
+        </p:nvSpPr>
+        <p:spPr>
+          <a:xfrm>
+            <a:off x="8032905" y="4667465"/>
+            <a:ext cx="1523174" cy="646331"/>
+          </a:xfrm>
+          <a:prstGeom prst="rect">
+            <a:avLst/>
+          </a:prstGeom>
+          <a:noFill/>
+        </p:spPr>
+        <p:txBody>
+          <a:bodyPr wrap="none" rtlCol="0">
+            <a:spAutoFit/>
+          </a:bodyPr>
+          <a:lstStyle/>
+          <a:p>
+            <a:r>
+              <a:rPr lang="en-US" dirty="0"/>
+              <a:t>Add photo to</a:t>
+            </a:r>
+          </a:p>
+          <a:p>
+            <a:r>
+              <a:rPr lang="en-US" dirty="0"/>
+              <a:t>note</a:t>
+            </a:r>
+            <a:endParaRPr lang="en-AU" dirty="0"/>
+          </a:p>
+        </p:txBody>
+      </p:sp>
+      <p:cxnSp>
+        <p:nvCxnSpPr>
+          <p:cNvPr id="29" name="Straight Arrow Connector 28">
+            <a:extLst>
+              <a:ext uri="{FF2B5EF4-FFF2-40B4-BE49-F238E27FC236}">
+                <a16:creationId xmlns:a16="http://schemas.microsoft.com/office/drawing/2014/main" id="{0098D66C-04D2-424C-92E9-E1A7E5448308}"/>
+              </a:ext>
+            </a:extLst>
+          </p:cNvPr>
+          <p:cNvCxnSpPr>
+            <a:cxnSpLocks/>
+          </p:cNvCxnSpPr>
+          <p:nvPr/>
+        </p:nvCxnSpPr>
+        <p:spPr>
+          <a:xfrm flipV="1">
+            <a:off x="2490039" y="5408196"/>
+            <a:ext cx="722393" cy="840204"/>
+          </a:xfrm>
+          <a:prstGeom prst="straightConnector1">
+            <a:avLst/>
+          </a:prstGeom>
+          <a:ln>
+            <a:tailEnd type="triangle"/>
+          </a:ln>
+        </p:spPr>
+        <p:style>
+          <a:lnRef idx="1">
+            <a:schemeClr val="accent1"/>
+          </a:lnRef>
+          <a:fillRef idx="0">
+            <a:schemeClr val="accent1"/>
+          </a:fillRef>
+          <a:effectRef idx="0">
+            <a:schemeClr val="accent1"/>
+          </a:effectRef>
+          <a:fontRef idx="minor">
+            <a:schemeClr val="tx1"/>
+          </a:fontRef>
+        </p:style>
+      </p:cxnSp>
+      <p:sp>
+        <p:nvSpPr>
+          <p:cNvPr id="32" name="TextBox 31">
+            <a:extLst>
+              <a:ext uri="{FF2B5EF4-FFF2-40B4-BE49-F238E27FC236}">
+                <a16:creationId xmlns:a16="http://schemas.microsoft.com/office/drawing/2014/main" id="{F687E4F0-A329-45A8-9314-4DC1DB98E69F}"/>
+              </a:ext>
+            </a:extLst>
+          </p:cNvPr>
+          <p:cNvSpPr txBox="1"/>
+          <p:nvPr/>
+        </p:nvSpPr>
+        <p:spPr>
+          <a:xfrm>
+            <a:off x="1604299" y="6202279"/>
+            <a:ext cx="1608133" cy="369332"/>
+          </a:xfrm>
+          <a:prstGeom prst="rect">
+            <a:avLst/>
+          </a:prstGeom>
+          <a:noFill/>
+        </p:spPr>
+        <p:txBody>
+          <a:bodyPr wrap="none" rtlCol="0">
+            <a:spAutoFit/>
+          </a:bodyPr>
+          <a:lstStyle/>
+          <a:p>
+            <a:r>
+              <a:rPr lang="en-US" dirty="0"/>
+              <a:t>Add new note</a:t>
+            </a:r>
+            <a:endParaRPr lang="en-AU" dirty="0"/>
+          </a:p>
+        </p:txBody>
+      </p:sp>
+      <p:cxnSp>
+        <p:nvCxnSpPr>
+          <p:cNvPr id="36" name="Straight Arrow Connector 35">
+            <a:extLst>
+              <a:ext uri="{FF2B5EF4-FFF2-40B4-BE49-F238E27FC236}">
+                <a16:creationId xmlns:a16="http://schemas.microsoft.com/office/drawing/2014/main" id="{2E618932-1414-47EA-B77D-D1A344EAFC84}"/>
+              </a:ext>
+            </a:extLst>
+          </p:cNvPr>
+          <p:cNvCxnSpPr>
+            <a:cxnSpLocks/>
+          </p:cNvCxnSpPr>
+          <p:nvPr/>
+        </p:nvCxnSpPr>
+        <p:spPr>
+          <a:xfrm flipH="1">
+            <a:off x="3729790" y="1305426"/>
+            <a:ext cx="920415" cy="860258"/>
+          </a:xfrm>
+          <a:prstGeom prst="straightConnector1">
+            <a:avLst/>
+          </a:prstGeom>
+          <a:ln>
+            <a:tailEnd type="triangle"/>
+          </a:ln>
+        </p:spPr>
+        <p:style>
+          <a:lnRef idx="1">
+            <a:schemeClr val="accent1"/>
+          </a:lnRef>
+          <a:fillRef idx="0">
+            <a:schemeClr val="accent1"/>
+          </a:fillRef>
+          <a:effectRef idx="0">
+            <a:schemeClr val="accent1"/>
+          </a:effectRef>
+          <a:fontRef idx="minor">
+            <a:schemeClr val="tx1"/>
+          </a:fontRef>
+        </p:style>
+      </p:cxnSp>
+      <p:sp>
+        <p:nvSpPr>
+          <p:cNvPr id="40" name="TextBox 39">
+            <a:extLst>
+              <a:ext uri="{FF2B5EF4-FFF2-40B4-BE49-F238E27FC236}">
+                <a16:creationId xmlns:a16="http://schemas.microsoft.com/office/drawing/2014/main" id="{8CBE36B4-87D2-4777-895E-B6C5FA5E132C}"/>
+              </a:ext>
+            </a:extLst>
+          </p:cNvPr>
+          <p:cNvSpPr txBox="1"/>
+          <p:nvPr/>
+        </p:nvSpPr>
+        <p:spPr>
+          <a:xfrm>
+            <a:off x="4435642" y="936094"/>
+            <a:ext cx="2441822" cy="369332"/>
+          </a:xfrm>
+          <a:prstGeom prst="rect">
+            <a:avLst/>
+          </a:prstGeom>
+          <a:noFill/>
+        </p:spPr>
+        <p:txBody>
+          <a:bodyPr wrap="none" rtlCol="0">
+            <a:spAutoFit/>
+          </a:bodyPr>
+          <a:lstStyle/>
+          <a:p>
+            <a:r>
+              <a:rPr lang="en-US" dirty="0"/>
+              <a:t>Tap to view/edit note</a:t>
+            </a:r>
+            <a:endParaRPr lang="en-AU" dirty="0"/>
+          </a:p>
+        </p:txBody>
+      </p:sp>
+    </p:spTree>
+    <p:extLst>
+      <p:ext uri="{BB962C8B-B14F-4D97-AF65-F5344CB8AC3E}">
+        <p14:creationId xmlns:p14="http://schemas.microsoft.com/office/powerpoint/2010/main" val="1423234636"/>
       </p:ext>
     </p:extLst>
   </p:cSld>
@@ -6420,4 +8325,299 @@
     </a:ext>
   </a:extLst>
 </a:theme>
+</file>
+
+<file path=ppt/theme/theme2.xml><?xml version="1.0" encoding="utf-8"?>
+<a:theme xmlns:a="http://schemas.openxmlformats.org/drawingml/2006/main" name="Office Theme">
+  <a:themeElements>
+    <a:clrScheme name="Office">
+      <a:dk1>
+        <a:sysClr val="windowText" lastClr="000000"/>
+      </a:dk1>
+      <a:lt1>
+        <a:sysClr val="window" lastClr="FFFFFF"/>
+      </a:lt1>
+      <a:dk2>
+        <a:srgbClr val="44546A"/>
+      </a:dk2>
+      <a:lt2>
+        <a:srgbClr val="E7E6E6"/>
+      </a:lt2>
+      <a:accent1>
+        <a:srgbClr val="4472C4"/>
+      </a:accent1>
+      <a:accent2>
+        <a:srgbClr val="ED7D31"/>
+      </a:accent2>
+      <a:accent3>
+        <a:srgbClr val="A5A5A5"/>
+      </a:accent3>
+      <a:accent4>
+        <a:srgbClr val="FFC000"/>
+      </a:accent4>
+      <a:accent5>
+        <a:srgbClr val="5B9BD5"/>
+      </a:accent5>
+      <a:accent6>
+        <a:srgbClr val="70AD47"/>
+      </a:accent6>
+      <a:hlink>
+        <a:srgbClr val="0563C1"/>
+      </a:hlink>
+      <a:folHlink>
+        <a:srgbClr val="954F72"/>
+      </a:folHlink>
+    </a:clrScheme>
+    <a:fontScheme name="Office">
+      <a:majorFont>
+        <a:latin typeface="Calibri Light" panose="020F0302020204030204"/>
+        <a:ea typeface=""/>
+        <a:cs typeface=""/>
+        <a:font script="Jpan" typeface="游ゴシック Light"/>
+        <a:font script="Hang" typeface="맑은 고딕"/>
+        <a:font script="Hans" typeface="等线 Light"/>
+        <a:font script="Hant" typeface="新細明體"/>
+        <a:font script="Arab" typeface="Times New Roman"/>
+        <a:font script="Hebr" typeface="Times New Roman"/>
+        <a:font script="Thai" typeface="Angsana New"/>
+        <a:font script="Ethi" typeface="Nyala"/>
+        <a:font script="Beng" typeface="Vrinda"/>
+        <a:font script="Gujr" typeface="Shruti"/>
+        <a:font script="Khmr" typeface="MoolBoran"/>
+        <a:font script="Knda" typeface="Tunga"/>
+        <a:font script="Guru" typeface="Raavi"/>
+        <a:font script="Cans" typeface="Euphemia"/>
+        <a:font script="Cher" typeface="Plantagenet Cherokee"/>
+        <a:font script="Yiii" typeface="Microsoft Yi Baiti"/>
+        <a:font script="Tibt" typeface="Microsoft Himalaya"/>
+        <a:font script="Thaa" typeface="MV Boli"/>
+        <a:font script="Deva" typeface="Mangal"/>
+        <a:font script="Telu" typeface="Gautami"/>
+        <a:font script="Taml" typeface="Latha"/>
+        <a:font script="Syrc" typeface="Estrangelo Edessa"/>
+        <a:font script="Orya" typeface="Kalinga"/>
+        <a:font script="Mlym" typeface="Kartika"/>
+        <a:font script="Laoo" typeface="DokChampa"/>
+        <a:font script="Sinh" typeface="Iskoola Pota"/>
+        <a:font script="Mong" typeface="Mongolian Baiti"/>
+        <a:font script="Viet" typeface="Times New Roman"/>
+        <a:font script="Uigh" typeface="Microsoft Uighur"/>
+        <a:font script="Geor" typeface="Sylfaen"/>
+        <a:font script="Armn" typeface="Arial"/>
+        <a:font script="Bugi" typeface="Leelawadee UI"/>
+        <a:font script="Bopo" typeface="Microsoft JhengHei"/>
+        <a:font script="Java" typeface="Javanese Text"/>
+        <a:font script="Lisu" typeface="Segoe UI"/>
+        <a:font script="Mymr" typeface="Myanmar Text"/>
+        <a:font script="Nkoo" typeface="Ebrima"/>
+        <a:font script="Olck" typeface="Nirmala UI"/>
+        <a:font script="Osma" typeface="Ebrima"/>
+        <a:font script="Phag" typeface="Phagspa"/>
+        <a:font script="Syrn" typeface="Estrangelo Edessa"/>
+        <a:font script="Syrj" typeface="Estrangelo Edessa"/>
+        <a:font script="Syre" typeface="Estrangelo Edessa"/>
+        <a:font script="Sora" typeface="Nirmala UI"/>
+        <a:font script="Tale" typeface="Microsoft Tai Le"/>
+        <a:font script="Talu" typeface="Microsoft New Tai Lue"/>
+        <a:font script="Tfng" typeface="Ebrima"/>
+      </a:majorFont>
+      <a:minorFont>
+        <a:latin typeface="Calibri" panose="020F0502020204030204"/>
+        <a:ea typeface=""/>
+        <a:cs typeface=""/>
+        <a:font script="Jpan" typeface="游ゴシック"/>
+        <a:font script="Hang" typeface="맑은 고딕"/>
+        <a:font script="Hans" typeface="等线"/>
+        <a:font script="Hant" typeface="新細明體"/>
+        <a:font script="Arab" typeface="Arial"/>
+        <a:font script="Hebr" typeface="Arial"/>
+        <a:font script="Thai" typeface="Cordia New"/>
+        <a:font script="Ethi" typeface="Nyala"/>
+        <a:font script="Beng" typeface="Vrinda"/>
+        <a:font script="Gujr" typeface="Shruti"/>
+        <a:font script="Khmr" typeface="DaunPenh"/>
+        <a:font script="Knda" typeface="Tunga"/>
+        <a:font script="Guru" typeface="Raavi"/>
+        <a:font script="Cans" typeface="Euphemia"/>
+        <a:font script="Cher" typeface="Plantagenet Cherokee"/>
+        <a:font script="Yiii" typeface="Microsoft Yi Baiti"/>
+        <a:font script="Tibt" typeface="Microsoft Himalaya"/>
+        <a:font script="Thaa" typeface="MV Boli"/>
+        <a:font script="Deva" typeface="Mangal"/>
+        <a:font script="Telu" typeface="Gautami"/>
+        <a:font script="Taml" typeface="Latha"/>
+        <a:font script="Syrc" typeface="Estrangelo Edessa"/>
+        <a:font script="Orya" typeface="Kalinga"/>
+        <a:font script="Mlym" typeface="Kartika"/>
+        <a:font script="Laoo" typeface="DokChampa"/>
+        <a:font script="Sinh" typeface="Iskoola Pota"/>
+        <a:font script="Mong" typeface="Mongolian Baiti"/>
+        <a:font script="Viet" typeface="Arial"/>
+        <a:font script="Uigh" typeface="Microsoft Uighur"/>
+        <a:font script="Geor" typeface="Sylfaen"/>
+        <a:font script="Armn" typeface="Arial"/>
+        <a:font script="Bugi" typeface="Leelawadee UI"/>
+        <a:font script="Bopo" typeface="Microsoft JhengHei"/>
+        <a:font script="Java" typeface="Javanese Text"/>
+        <a:font script="Lisu" typeface="Segoe UI"/>
+        <a:font script="Mymr" typeface="Myanmar Text"/>
+        <a:font script="Nkoo" typeface="Ebrima"/>
+        <a:font script="Olck" typeface="Nirmala UI"/>
+        <a:font script="Osma" typeface="Ebrima"/>
+        <a:font script="Phag" typeface="Phagspa"/>
+        <a:font script="Syrn" typeface="Estrangelo Edessa"/>
+        <a:font script="Syrj" typeface="Estrangelo Edessa"/>
+        <a:font script="Syre" typeface="Estrangelo Edessa"/>
+        <a:font script="Sora" typeface="Nirmala UI"/>
+        <a:font script="Tale" typeface="Microsoft Tai Le"/>
+        <a:font script="Talu" typeface="Microsoft New Tai Lue"/>
+        <a:font script="Tfng" typeface="Ebrima"/>
+      </a:minorFont>
+    </a:fontScheme>
+    <a:fmtScheme name="Office">
+      <a:fillStyleLst>
+        <a:solidFill>
+          <a:schemeClr val="phClr"/>
+        </a:solidFill>
+        <a:gradFill rotWithShape="1">
+          <a:gsLst>
+            <a:gs pos="0">
+              <a:schemeClr val="phClr">
+                <a:lumMod val="110000"/>
+                <a:satMod val="105000"/>
+                <a:tint val="67000"/>
+              </a:schemeClr>
+            </a:gs>
+            <a:gs pos="50000">
+              <a:schemeClr val="phClr">
+                <a:lumMod val="105000"/>
+                <a:satMod val="103000"/>
+                <a:tint val="73000"/>
+              </a:schemeClr>
+            </a:gs>
+            <a:gs pos="100000">
+              <a:schemeClr val="phClr">
+                <a:lumMod val="105000"/>
+                <a:satMod val="109000"/>
+                <a:tint val="81000"/>
+              </a:schemeClr>
+            </a:gs>
+          </a:gsLst>
+          <a:lin ang="5400000" scaled="0"/>
+        </a:gradFill>
+        <a:gradFill rotWithShape="1">
+          <a:gsLst>
+            <a:gs pos="0">
+              <a:schemeClr val="phClr">
+                <a:satMod val="103000"/>
+                <a:lumMod val="102000"/>
+                <a:tint val="94000"/>
+              </a:schemeClr>
+            </a:gs>
+            <a:gs pos="50000">
+              <a:schemeClr val="phClr">
+                <a:satMod val="110000"/>
+                <a:lumMod val="100000"/>
+                <a:shade val="100000"/>
+              </a:schemeClr>
+            </a:gs>
+            <a:gs pos="100000">
+              <a:schemeClr val="phClr">
+                <a:lumMod val="99000"/>
+                <a:satMod val="120000"/>
+                <a:shade val="78000"/>
+              </a:schemeClr>
+            </a:gs>
+          </a:gsLst>
+          <a:lin ang="5400000" scaled="0"/>
+        </a:gradFill>
+      </a:fillStyleLst>
+      <a:lnStyleLst>
+        <a:ln w="6350" cap="flat" cmpd="sng" algn="ctr">
+          <a:solidFill>
+            <a:schemeClr val="phClr"/>
+          </a:solidFill>
+          <a:prstDash val="solid"/>
+          <a:miter lim="800000"/>
+        </a:ln>
+        <a:ln w="12700" cap="flat" cmpd="sng" algn="ctr">
+          <a:solidFill>
+            <a:schemeClr val="phClr"/>
+          </a:solidFill>
+          <a:prstDash val="solid"/>
+          <a:miter lim="800000"/>
+        </a:ln>
+        <a:ln w="19050" cap="flat" cmpd="sng" algn="ctr">
+          <a:solidFill>
+            <a:schemeClr val="phClr"/>
+          </a:solidFill>
+          <a:prstDash val="solid"/>
+          <a:miter lim="800000"/>
+        </a:ln>
+      </a:lnStyleLst>
+      <a:effectStyleLst>
+        <a:effectStyle>
+          <a:effectLst/>
+        </a:effectStyle>
+        <a:effectStyle>
+          <a:effectLst/>
+        </a:effectStyle>
+        <a:effectStyle>
+          <a:effectLst>
+            <a:outerShdw blurRad="57150" dist="19050" dir="5400000" algn="ctr" rotWithShape="0">
+              <a:srgbClr val="000000">
+                <a:alpha val="63000"/>
+              </a:srgbClr>
+            </a:outerShdw>
+          </a:effectLst>
+        </a:effectStyle>
+      </a:effectStyleLst>
+      <a:bgFillStyleLst>
+        <a:solidFill>
+          <a:schemeClr val="phClr"/>
+        </a:solidFill>
+        <a:solidFill>
+          <a:schemeClr val="phClr">
+            <a:tint val="95000"/>
+            <a:satMod val="170000"/>
+          </a:schemeClr>
+        </a:solidFill>
+        <a:gradFill rotWithShape="1">
+          <a:gsLst>
+            <a:gs pos="0">
+              <a:schemeClr val="phClr">
+                <a:tint val="93000"/>
+                <a:satMod val="150000"/>
+                <a:shade val="98000"/>
+                <a:lumMod val="102000"/>
+              </a:schemeClr>
+            </a:gs>
+            <a:gs pos="50000">
+              <a:schemeClr val="phClr">
+                <a:tint val="98000"/>
+                <a:satMod val="130000"/>
+                <a:shade val="90000"/>
+                <a:lumMod val="103000"/>
+              </a:schemeClr>
+            </a:gs>
+            <a:gs pos="100000">
+              <a:schemeClr val="phClr">
+                <a:shade val="63000"/>
+                <a:satMod val="120000"/>
+              </a:schemeClr>
+            </a:gs>
+          </a:gsLst>
+          <a:lin ang="5400000" scaled="0"/>
+        </a:gradFill>
+      </a:bgFillStyleLst>
+    </a:fmtScheme>
+  </a:themeElements>
+  <a:objectDefaults/>
+  <a:extraClrSchemeLst/>
+  <a:extLst>
+    <a:ext uri="{05A4C25C-085E-4340-85A3-A5531E510DB2}">
+      <thm15:themeFamily xmlns:thm15="http://schemas.microsoft.com/office/thememl/2012/main" name="Office Theme" id="{62F939B6-93AF-4DB8-9C6B-D6C7DFDC589F}" vid="{4A3C46E8-61CC-4603-A589-7422A47A8E4A}"/>
+    </a:ext>
+  </a:extLst>
+</a:theme>
 </file>
</xml_diff>